<commit_message>
Ajustes a los contenidos del Lab.md de CSS
</commit_message>
<xml_diff>
--- a/4. Mejores prácticas para utilizar CSS/HOL.B/CSS.pptx
+++ b/4. Mejores prácticas para utilizar CSS/HOL.B/CSS.pptx
@@ -2033,7 +2033,7 @@
           <a:p>
             <a:fld id="{F44C60D7-D4A5-420C-838F-ECED9455B05C}" type="datetimeFigureOut">
               <a:rPr lang="es-CO" smtClean="0"/>
-              <a:t>28/10/2015</a:t>
+              <a:t>29/10/2015</a:t>
             </a:fld>
             <a:endParaRPr lang="es-CO"/>
           </a:p>
@@ -2298,7 +2298,7 @@
           <a:p>
             <a:fld id="{F44C60D7-D4A5-420C-838F-ECED9455B05C}" type="datetimeFigureOut">
               <a:rPr lang="es-CO" smtClean="0"/>
-              <a:t>28/10/2015</a:t>
+              <a:t>29/10/2015</a:t>
             </a:fld>
             <a:endParaRPr lang="es-CO"/>
           </a:p>
@@ -2516,7 +2516,7 @@
           <a:p>
             <a:fld id="{F44C60D7-D4A5-420C-838F-ECED9455B05C}" type="datetimeFigureOut">
               <a:rPr lang="es-CO" smtClean="0"/>
-              <a:t>28/10/2015</a:t>
+              <a:t>29/10/2015</a:t>
             </a:fld>
             <a:endParaRPr lang="es-CO"/>
           </a:p>
@@ -2921,7 +2921,6 @@
               <a:rPr lang="es-CO" dirty="0"/>
               <a:t>Mejores prácticas para utilizar CSS</a:t>
             </a:r>
-            <a:endParaRPr lang="es-CO" dirty="0"/>
           </a:p>
         </p:txBody>
       </p:sp>
@@ -2950,11 +2949,7 @@
             </a:r>
             <a:r>
               <a:rPr lang="es-CO" dirty="0" smtClean="0"/>
-              <a:t>y</a:t>
-            </a:r>
-            <a:r>
-              <a:rPr lang="es-CO" dirty="0" smtClean="0"/>
-              <a:t> CSS 3.0</a:t>
+              <a:t>y CSS 3.0</a:t>
             </a:r>
             <a:endParaRPr lang="es-CO" dirty="0"/>
           </a:p>
@@ -3927,7 +3922,7 @@
         </p:spPr>
         <p:txBody>
           <a:bodyPr>
-            <a:normAutofit fontScale="92500" lnSpcReduction="10000"/>
+            <a:normAutofit fontScale="92500" lnSpcReduction="20000"/>
           </a:bodyPr>
           <a:lstStyle/>
           <a:p>
@@ -3979,6 +3974,24 @@
                 <a:srgbClr val="0070C0"/>
               </a:solidFill>
             </a:endParaRPr>
+          </a:p>
+          <a:p>
+            <a:r>
+              <a:rPr lang="es-CO" dirty="0" smtClean="0"/>
+              <a:t>Usar </a:t>
+            </a:r>
+            <a:r>
+              <a:rPr lang="es-CO" dirty="0" err="1" smtClean="0"/>
+              <a:t>rgba</a:t>
+            </a:r>
+            <a:r>
+              <a:rPr lang="es-CO" dirty="0" smtClean="0"/>
+              <a:t>() para usar color </a:t>
+            </a:r>
+            <a:r>
+              <a:rPr lang="es-CO" smtClean="0"/>
+              <a:t>con transparencia</a:t>
+            </a:r>
           </a:p>
           <a:p>
             <a:r>

</xml_diff>